<commit_message>
Deleted a slide or two in the ppt
</commit_message>
<xml_diff>
--- a/Documentation/Finals_Sysadd1.pptx
+++ b/Documentation/Finals_Sysadd1.pptx
@@ -5,7 +5,7 @@
     <p:sldMasterId id="2147483648" r:id="rId1"/>
   </p:sldMasterIdLst>
   <p:notesMasterIdLst>
-    <p:notesMasterId r:id="rId28"/>
+    <p:notesMasterId r:id="rId27"/>
   </p:notesMasterIdLst>
   <p:sldIdLst>
     <p:sldId id="256" r:id="rId2"/>
@@ -30,10 +30,9 @@
     <p:sldId id="330" r:id="rId21"/>
     <p:sldId id="331" r:id="rId22"/>
     <p:sldId id="333" r:id="rId23"/>
-    <p:sldId id="326" r:id="rId24"/>
-    <p:sldId id="305" r:id="rId25"/>
-    <p:sldId id="306" r:id="rId26"/>
-    <p:sldId id="307" r:id="rId27"/>
+    <p:sldId id="305" r:id="rId24"/>
+    <p:sldId id="306" r:id="rId25"/>
+    <p:sldId id="307" r:id="rId26"/>
   </p:sldIdLst>
   <p:sldSz cx="12192000" cy="6858000"/>
   <p:notesSz cx="6858000" cy="9144000"/>
@@ -1700,93 +1699,6 @@
     <p:extLst>
       <p:ext uri="{BB962C8B-B14F-4D97-AF65-F5344CB8AC3E}">
         <p14:creationId xmlns:p14="http://schemas.microsoft.com/office/powerpoint/2010/main" val="178890007"/>
-      </p:ext>
-    </p:extLst>
-  </p:cSld>
-  <p:clrMapOvr>
-    <a:masterClrMapping/>
-  </p:clrMapOvr>
-</p:notes>
-</file>
-
-<file path=ppt/notesSlides/notesSlide22.xml><?xml version="1.0" encoding="utf-8"?>
-<p:notes xmlns:a="http://schemas.openxmlformats.org/drawingml/2006/main" xmlns:r="http://schemas.openxmlformats.org/officeDocument/2006/relationships" xmlns:p="http://schemas.openxmlformats.org/presentationml/2006/main">
-  <p:cSld>
-    <p:spTree>
-      <p:nvGrpSpPr>
-        <p:cNvPr id="1" name=""/>
-        <p:cNvGrpSpPr/>
-        <p:nvPr/>
-      </p:nvGrpSpPr>
-      <p:grpSpPr>
-        <a:xfrm>
-          <a:off x="0" y="0"/>
-          <a:ext cx="0" cy="0"/>
-          <a:chOff x="0" y="0"/>
-          <a:chExt cx="0" cy="0"/>
-        </a:xfrm>
-      </p:grpSpPr>
-      <p:sp>
-        <p:nvSpPr>
-          <p:cNvPr id="2" name="Slide Image Placeholder 1"/>
-          <p:cNvSpPr>
-            <a:spLocks noGrp="1" noRot="1" noChangeAspect="1"/>
-          </p:cNvSpPr>
-          <p:nvPr>
-            <p:ph type="sldImg"/>
-          </p:nvPr>
-        </p:nvSpPr>
-        <p:spPr/>
-      </p:sp>
-      <p:sp>
-        <p:nvSpPr>
-          <p:cNvPr id="3" name="Notes Placeholder 2"/>
-          <p:cNvSpPr>
-            <a:spLocks noGrp="1"/>
-          </p:cNvSpPr>
-          <p:nvPr>
-            <p:ph type="body" idx="1"/>
-          </p:nvPr>
-        </p:nvSpPr>
-        <p:spPr/>
-        <p:txBody>
-          <a:bodyPr/>
-          <a:lstStyle/>
-          <a:p>
-            <a:r>
-              <a:rPr lang="en-PH" dirty="0"/>
-              <a:t>Maj</a:t>
-            </a:r>
-          </a:p>
-        </p:txBody>
-      </p:sp>
-      <p:sp>
-        <p:nvSpPr>
-          <p:cNvPr id="4" name="Slide Number Placeholder 3"/>
-          <p:cNvSpPr>
-            <a:spLocks noGrp="1"/>
-          </p:cNvSpPr>
-          <p:nvPr>
-            <p:ph type="sldNum" sz="quarter" idx="10"/>
-          </p:nvPr>
-        </p:nvSpPr>
-        <p:spPr/>
-        <p:txBody>
-          <a:bodyPr/>
-          <a:lstStyle/>
-          <a:p>
-            <a:fld id="{86FFBDB5-9589-48C5-8577-C15F048505D7}" type="slidenum">
-              <a:rPr lang="en-PH" smtClean="0"/>
-              <a:t>23</a:t>
-            </a:fld>
-            <a:endParaRPr lang="en-PH"/>
-          </a:p>
-        </p:txBody>
-      </p:sp>
-    </p:spTree>
-    <p:extLst>
-      <p:ext uri="{BB962C8B-B14F-4D97-AF65-F5344CB8AC3E}">
-        <p14:creationId xmlns:p14="http://schemas.microsoft.com/office/powerpoint/2010/main" val="2650805779"/>
       </p:ext>
     </p:extLst>
   </p:cSld>
@@ -16575,7 +16487,7 @@
 </file>
 
 <file path=ppt/slides/slide23.xml><?xml version="1.0" encoding="utf-8"?>
-<p:sld xmlns:a="http://schemas.openxmlformats.org/drawingml/2006/main" xmlns:r="http://schemas.openxmlformats.org/officeDocument/2006/relationships" xmlns:p="http://schemas.openxmlformats.org/presentationml/2006/main">
+<p:sld xmlns:a="http://schemas.openxmlformats.org/drawingml/2006/main" xmlns:r="http://schemas.openxmlformats.org/officeDocument/2006/relationships" xmlns:p="http://schemas.openxmlformats.org/presentationml/2006/main" show="0">
   <p:cSld>
     <p:spTree>
       <p:nvGrpSpPr>
@@ -16608,21 +16520,23 @@
           <a:p>
             <a:r>
               <a:rPr lang="en-PH" dirty="0"/>
-              <a:t>Current System</a:t>
+              <a:t>Trello Screenshot</a:t>
             </a:r>
           </a:p>
         </p:txBody>
       </p:sp>
       <p:pic>
         <p:nvPicPr>
-          <p:cNvPr id="4" name="Picture 3"/>
+          <p:cNvPr id="4" name="Content Placeholder 3" descr="Screen Clipping"/>
           <p:cNvPicPr>
-            <a:picLocks noChangeAspect="1"/>
+            <a:picLocks noGrp="1" noChangeAspect="1"/>
           </p:cNvPicPr>
-          <p:nvPr/>
+          <p:nvPr>
+            <p:ph idx="1"/>
+          </p:nvPr>
         </p:nvPicPr>
         <p:blipFill>
-          <a:blip r:embed="rId3">
+          <a:blip r:embed="rId2">
             <a:extLst>
               <a:ext uri="{28A0092B-C50C-407E-A947-70E740481C1C}">
                 <a14:useLocalDpi xmlns:a14="http://schemas.microsoft.com/office/drawing/2010/main" val="0"/>
@@ -16635,125 +16549,15 @@
         </p:blipFill>
         <p:spPr>
           <a:xfrm>
-            <a:off x="10343804" y="4696690"/>
-            <a:ext cx="2435221" cy="2435221"/>
-          </a:xfrm>
-          <a:prstGeom prst="rect">
-            <a:avLst/>
-          </a:prstGeom>
-        </p:spPr>
-      </p:pic>
-      <p:pic>
-        <p:nvPicPr>
-          <p:cNvPr id="5" name="Picture 4"/>
-          <p:cNvPicPr>
-            <a:picLocks noChangeAspect="1"/>
-          </p:cNvPicPr>
-          <p:nvPr/>
-        </p:nvPicPr>
-        <p:blipFill>
-          <a:blip r:embed="rId4" cstate="hqprint">
-            <a:extLst>
-              <a:ext uri="{28A0092B-C50C-407E-A947-70E740481C1C}">
-                <a14:useLocalDpi xmlns:a14="http://schemas.microsoft.com/office/drawing/2010/main" val="0"/>
-              </a:ext>
-            </a:extLst>
-          </a:blip>
-          <a:stretch>
-            <a:fillRect/>
-          </a:stretch>
-        </p:blipFill>
-        <p:spPr>
-          <a:xfrm>
-            <a:off x="9882312" y="4197927"/>
-            <a:ext cx="1391006" cy="1391006"/>
-          </a:xfrm>
-          <a:prstGeom prst="rect">
-            <a:avLst/>
-          </a:prstGeom>
-        </p:spPr>
-      </p:pic>
-      <p:sp>
-        <p:nvSpPr>
-          <p:cNvPr id="3" name="Content Placeholder 2"/>
-          <p:cNvSpPr>
-            <a:spLocks noGrp="1"/>
-          </p:cNvSpPr>
-          <p:nvPr>
-            <p:ph idx="1"/>
-          </p:nvPr>
-        </p:nvSpPr>
-        <p:spPr>
-          <a:xfrm>
-            <a:off x="924103" y="1518410"/>
-            <a:ext cx="9653712" cy="4980276"/>
-          </a:xfrm>
-        </p:spPr>
-        <p:txBody>
-          <a:bodyPr>
-            <a:normAutofit/>
-          </a:bodyPr>
-          <a:lstStyle/>
-          <a:p>
-            <a:r>
-              <a:rPr lang="en-PH" dirty="0"/>
-              <a:t>Uses a hash function for security measures</a:t>
-            </a:r>
-          </a:p>
-          <a:p>
-            <a:r>
-              <a:rPr lang="en-PH" dirty="0"/>
-              <a:t>MD5 is a command that generates a hash code, which serves as the digital fingerprint of the file.</a:t>
-            </a:r>
-          </a:p>
-          <a:p>
-            <a:r>
-              <a:rPr lang="en-PH" dirty="0"/>
-              <a:t>Specifically called MD5, which have been proven to be a weak technology over the years</a:t>
-            </a:r>
-          </a:p>
-          <a:p>
-            <a:endParaRPr lang="en-PH" dirty="0"/>
-          </a:p>
-          <a:p>
-            <a:endParaRPr lang="en-PH" dirty="0"/>
-          </a:p>
-        </p:txBody>
-      </p:sp>
-      <p:pic>
-        <p:nvPicPr>
-          <p:cNvPr id="7" name="Picture 6"/>
-          <p:cNvPicPr>
-            <a:picLocks noChangeAspect="1"/>
-          </p:cNvPicPr>
-          <p:nvPr/>
-        </p:nvPicPr>
-        <p:blipFill>
-          <a:blip r:embed="rId5">
-            <a:extLst>
-              <a:ext uri="{28A0092B-C50C-407E-A947-70E740481C1C}">
-                <a14:useLocalDpi xmlns:a14="http://schemas.microsoft.com/office/drawing/2010/main" val="0"/>
-              </a:ext>
-            </a:extLst>
-          </a:blip>
-          <a:stretch>
-            <a:fillRect/>
-          </a:stretch>
-        </p:blipFill>
-        <p:spPr>
-          <a:xfrm>
-            <a:off x="1499054" y="1961866"/>
-            <a:ext cx="8068765" cy="3952434"/>
-          </a:xfrm>
-          <a:prstGeom prst="rect">
-            <a:avLst/>
-          </a:prstGeom>
+            <a:off x="1476940" y="1825625"/>
+            <a:ext cx="9238120" cy="4351338"/>
+          </a:xfrm>
         </p:spPr>
       </p:pic>
     </p:spTree>
     <p:extLst>
       <p:ext uri="{BB962C8B-B14F-4D97-AF65-F5344CB8AC3E}">
-        <p14:creationId xmlns:p14="http://schemas.microsoft.com/office/powerpoint/2010/main" val="3991731921"/>
+        <p14:creationId xmlns:p14="http://schemas.microsoft.com/office/powerpoint/2010/main" val="1488904389"/>
       </p:ext>
     </p:extLst>
   </p:cSld>
@@ -16797,7 +16601,7 @@
           <a:p>
             <a:r>
               <a:rPr lang="en-PH" dirty="0"/>
-              <a:t>Trello Screenshot</a:t>
+              <a:t>Trello Screenshot cont.</a:t>
             </a:r>
           </a:p>
         </p:txBody>
@@ -16826,87 +16630,6 @@
         </p:blipFill>
         <p:spPr>
           <a:xfrm>
-            <a:off x="1476940" y="1825625"/>
-            <a:ext cx="9238120" cy="4351338"/>
-          </a:xfrm>
-        </p:spPr>
-      </p:pic>
-    </p:spTree>
-    <p:extLst>
-      <p:ext uri="{BB962C8B-B14F-4D97-AF65-F5344CB8AC3E}">
-        <p14:creationId xmlns:p14="http://schemas.microsoft.com/office/powerpoint/2010/main" val="1488904389"/>
-      </p:ext>
-    </p:extLst>
-  </p:cSld>
-  <p:clrMapOvr>
-    <a:masterClrMapping/>
-  </p:clrMapOvr>
-</p:sld>
-</file>
-
-<file path=ppt/slides/slide25.xml><?xml version="1.0" encoding="utf-8"?>
-<p:sld xmlns:a="http://schemas.openxmlformats.org/drawingml/2006/main" xmlns:r="http://schemas.openxmlformats.org/officeDocument/2006/relationships" xmlns:p="http://schemas.openxmlformats.org/presentationml/2006/main" show="0">
-  <p:cSld>
-    <p:spTree>
-      <p:nvGrpSpPr>
-        <p:cNvPr id="1" name=""/>
-        <p:cNvGrpSpPr/>
-        <p:nvPr/>
-      </p:nvGrpSpPr>
-      <p:grpSpPr>
-        <a:xfrm>
-          <a:off x="0" y="0"/>
-          <a:ext cx="0" cy="0"/>
-          <a:chOff x="0" y="0"/>
-          <a:chExt cx="0" cy="0"/>
-        </a:xfrm>
-      </p:grpSpPr>
-      <p:sp>
-        <p:nvSpPr>
-          <p:cNvPr id="2" name="Title 1"/>
-          <p:cNvSpPr>
-            <a:spLocks noGrp="1"/>
-          </p:cNvSpPr>
-          <p:nvPr>
-            <p:ph type="title"/>
-          </p:nvPr>
-        </p:nvSpPr>
-        <p:spPr/>
-        <p:txBody>
-          <a:bodyPr/>
-          <a:lstStyle/>
-          <a:p>
-            <a:r>
-              <a:rPr lang="en-PH" dirty="0"/>
-              <a:t>Trello Screenshot cont.</a:t>
-            </a:r>
-          </a:p>
-        </p:txBody>
-      </p:sp>
-      <p:pic>
-        <p:nvPicPr>
-          <p:cNvPr id="4" name="Content Placeholder 3" descr="Screen Clipping"/>
-          <p:cNvPicPr>
-            <a:picLocks noGrp="1" noChangeAspect="1"/>
-          </p:cNvPicPr>
-          <p:nvPr>
-            <p:ph idx="1"/>
-          </p:nvPr>
-        </p:nvPicPr>
-        <p:blipFill>
-          <a:blip r:embed="rId2">
-            <a:extLst>
-              <a:ext uri="{28A0092B-C50C-407E-A947-70E740481C1C}">
-                <a14:useLocalDpi xmlns:a14="http://schemas.microsoft.com/office/drawing/2010/main" val="0"/>
-              </a:ext>
-            </a:extLst>
-          </a:blip>
-          <a:stretch>
-            <a:fillRect/>
-          </a:stretch>
-        </p:blipFill>
-        <p:spPr>
-          <a:xfrm>
             <a:off x="1613202" y="1825625"/>
             <a:ext cx="8965596" cy="4351338"/>
           </a:xfrm>
@@ -16925,7 +16648,7 @@
 </p:sld>
 </file>
 
-<file path=ppt/slides/slide26.xml><?xml version="1.0" encoding="utf-8"?>
+<file path=ppt/slides/slide25.xml><?xml version="1.0" encoding="utf-8"?>
 <p:sld xmlns:a="http://schemas.openxmlformats.org/drawingml/2006/main" xmlns:r="http://schemas.openxmlformats.org/officeDocument/2006/relationships" xmlns:p="http://schemas.openxmlformats.org/presentationml/2006/main" show="0">
   <p:cSld>
     <p:spTree>

</xml_diff>